<commit_message>
revise confidence vs prediction/truth slides
</commit_message>
<xml_diff>
--- a/spring16/slidesS16/confidence-vs-truth.pptx
+++ b/spring16/slidesS16/confidence-vs-truth.pptx
@@ -18,7 +18,7 @@
     <p:sldId id="436" r:id="rId6"/>
     <p:sldId id="432" r:id="rId7"/>
     <p:sldId id="434" r:id="rId8"/>
-    <p:sldId id="437" r:id="rId9"/>
+    <p:sldId id="443" r:id="rId9"/>
     <p:sldId id="420" r:id="rId10"/>
     <p:sldId id="419" r:id="rId11"/>
     <p:sldId id="421" r:id="rId12"/>
@@ -3919,13 +3919,7 @@
               <a:rPr lang="en-US" sz="5400" dirty="0" smtClean="0">
                 <a:latin typeface="Comic Sans MS" pitchFamily="66" charset="0"/>
               </a:rPr>
-              <a:t>Talking </a:t>
-            </a:r>
-            <a:r>
-              <a:rPr lang="en-US" sz="5400" dirty="0" smtClean="0">
-                <a:latin typeface="Comic Sans MS" pitchFamily="66" charset="0"/>
-              </a:rPr>
-              <a:t>about</a:t>
+              <a:t>Talking about</a:t>
             </a:r>
           </a:p>
           <a:p>
@@ -3949,7 +3943,9 @@
             <a:r>
               <a:rPr lang="en-US" sz="5400" dirty="0" smtClean="0">
                 <a:solidFill>
-                  <a:srgbClr val="7030A0"/>
+                  <a:schemeClr val="accent1">
+                    <a:lumMod val="50000"/>
+                  </a:schemeClr>
                 </a:solidFill>
                 <a:latin typeface="Comic Sans MS" pitchFamily="66" charset="0"/>
               </a:rPr>
@@ -3977,13 +3973,7 @@
               <a:rPr lang="en-US" sz="5400" dirty="0" smtClean="0">
                 <a:latin typeface="Comic Sans MS" pitchFamily="66" charset="0"/>
               </a:rPr>
-              <a:t>you </a:t>
-            </a:r>
-            <a:r>
-              <a:rPr lang="en-US" sz="5400" dirty="0" smtClean="0">
-                <a:latin typeface="Comic Sans MS" pitchFamily="66" charset="0"/>
-              </a:rPr>
-              <a:t>  </a:t>
+              <a:t>you   </a:t>
             </a:r>
           </a:p>
           <a:p>
@@ -4006,15 +3996,18 @@
             </a:r>
             <a:r>
               <a:rPr lang="en-US" sz="5400" dirty="0" smtClean="0">
+                <a:solidFill>
+                  <a:srgbClr val="0000E5"/>
+                </a:solidFill>
                 <a:latin typeface="Comic Sans MS" pitchFamily="66" charset="0"/>
               </a:rPr>
-              <a:t>personally </a:t>
+              <a:t>personally</a:t>
             </a:r>
             <a:r>
               <a:rPr lang="en-US" sz="5400" dirty="0" smtClean="0">
                 <a:latin typeface="Comic Sans MS" pitchFamily="66" charset="0"/>
               </a:rPr>
-              <a:t>have TB”</a:t>
+              <a:t> have TB”</a:t>
             </a:r>
             <a:endParaRPr lang="en-US" sz="5400" dirty="0">
               <a:latin typeface="Comic Sans MS" pitchFamily="66" charset="0"/>
@@ -4875,7 +4868,19 @@
               <a:rPr lang="en-US" sz="4800" dirty="0" smtClean="0">
                 <a:latin typeface="Comic Sans MS" pitchFamily="66" charset="0"/>
               </a:rPr>
-              <a:t>talk about the probability the test is correct. We can say “A test which is correct 98% of the time shows you have TB.”</a:t>
+              <a:t>talk about the probability the test is correct. We can say “A test which is correct </a:t>
+            </a:r>
+            <a:r>
+              <a:rPr lang="en-US" sz="4800" dirty="0" smtClean="0">
+                <a:latin typeface="Comic Sans MS" pitchFamily="66" charset="0"/>
+              </a:rPr>
+              <a:t>99% </a:t>
+            </a:r>
+            <a:r>
+              <a:rPr lang="en-US" sz="4800" dirty="0" smtClean="0">
+                <a:latin typeface="Comic Sans MS" pitchFamily="66" charset="0"/>
+              </a:rPr>
+              <a:t>of the time shows you have TB.”</a:t>
             </a:r>
             <a:endParaRPr lang="en-US" sz="4800" dirty="0">
               <a:latin typeface="Comic Sans MS" pitchFamily="66" charset="0"/>
@@ -5099,9 +5104,6 @@
               </a:rPr>
               <a:t>say</a:t>
             </a:r>
-            <a:endParaRPr lang="en-US" sz="5400" dirty="0" smtClean="0">
-              <a:latin typeface="Comic Sans MS" pitchFamily="66" charset="0"/>
-            </a:endParaRPr>
           </a:p>
           <a:p>
             <a:pPr algn="l">
@@ -5134,7 +5136,7 @@
                 </a:solidFill>
                 <a:latin typeface="Comic Sans MS" pitchFamily="66" charset="0"/>
               </a:rPr>
-              <a:t>98% </a:t>
+              <a:t>99% </a:t>
             </a:r>
             <a:r>
               <a:rPr lang="en-US" sz="6000" dirty="0">
@@ -5404,7 +5406,19 @@
               <a:rPr lang="en-US" sz="6000" dirty="0" smtClean="0">
                 <a:latin typeface="Comic Sans MS" pitchFamily="66" charset="0"/>
               </a:rPr>
-              <a:t>something unlikely (2%)</a:t>
+              <a:t>something unlikely </a:t>
+            </a:r>
+            <a:r>
+              <a:rPr lang="en-US" sz="6000" dirty="0" smtClean="0">
+                <a:latin typeface="Comic Sans MS" pitchFamily="66" charset="0"/>
+              </a:rPr>
+              <a:t>(1%</a:t>
+            </a:r>
+            <a:r>
+              <a:rPr lang="en-US" sz="6000" dirty="0" smtClean="0">
+                <a:latin typeface="Comic Sans MS" pitchFamily="66" charset="0"/>
+              </a:rPr>
+              <a:t>)</a:t>
             </a:r>
           </a:p>
           <a:p>
@@ -5999,13 +6013,7 @@
               <a:rPr lang="en-US" sz="6000" dirty="0" smtClean="0">
                 <a:latin typeface="Comic Sans MS" pitchFamily="66" charset="0"/>
               </a:rPr>
-              <a:t>, and many are unlikely.  The unlikely event may offer little </a:t>
-            </a:r>
-            <a:r>
-              <a:rPr lang="en-US" sz="6000" dirty="0" smtClean="0">
-                <a:latin typeface="Comic Sans MS" pitchFamily="66" charset="0"/>
-              </a:rPr>
-              <a:t>information about TB.</a:t>
+              <a:t>, and many are unlikely.  The unlikely event may offer little information about TB.</a:t>
             </a:r>
             <a:endParaRPr lang="en-US" sz="6000" dirty="0">
               <a:latin typeface="Comic Sans MS" pitchFamily="66" charset="0"/>
@@ -6154,8 +6162,8 @@
         </p:nvSpPr>
         <p:spPr>
           <a:xfrm>
-            <a:off x="152400" y="1524000"/>
-            <a:ext cx="8915400" cy="3886200"/>
+            <a:off x="304800" y="1447800"/>
+            <a:ext cx="8534400" cy="4038600"/>
           </a:xfrm>
         </p:spPr>
         <p:txBody>
@@ -6164,30 +6172,17 @@
           <a:p>
             <a:r>
               <a:rPr lang="en-US" sz="5400" dirty="0" smtClean="0"/>
-              <a:t>Claiming a fact holds </a:t>
-            </a:r>
-            <a:r>
-              <a:rPr lang="en-US" sz="5400" dirty="0" smtClean="0"/>
-              <a:t>at a </a:t>
-            </a:r>
-            <a:endParaRPr lang="en-US" sz="5400" dirty="0" smtClean="0"/>
-          </a:p>
-          <a:p>
-            <a:r>
-              <a:rPr lang="en-US" sz="5400" smtClean="0">
-                <a:solidFill>
-                  <a:srgbClr val="006600"/>
-                </a:solidFill>
-              </a:rPr>
-              <a:t>high confidence </a:t>
-            </a:r>
+              <a:t>Claiming a fact holds at a </a:t>
+            </a:r>
+          </a:p>
+          <a:p>
             <a:r>
               <a:rPr lang="en-US" sz="5400" dirty="0" smtClean="0">
                 <a:solidFill>
                   <a:srgbClr val="006600"/>
                 </a:solidFill>
               </a:rPr>
-              <a:t>level</a:t>
+              <a:t>high confidence level</a:t>
             </a:r>
             <a:r>
               <a:rPr lang="en-US" sz="5400" dirty="0" smtClean="0"/>
@@ -6955,7 +6950,7 @@
                 </a:solidFill>
                 <a:latin typeface="Comic Sans MS" pitchFamily="66" charset="0"/>
               </a:rPr>
-              <a:t>98% </a:t>
+              <a:t>99% </a:t>
             </a:r>
             <a:r>
               <a:rPr lang="en-US" sz="4800" kern="0" dirty="0">
@@ -7012,7 +7007,15 @@
                   <a:schemeClr val="tx1"/>
                 </a:solidFill>
               </a:rPr>
-              <a:t>98% accurate TB testing</a:t>
+              <a:t>99% </a:t>
+            </a:r>
+            <a:r>
+              <a:rPr lang="en-US" sz="4000" dirty="0" smtClean="0">
+                <a:solidFill>
+                  <a:schemeClr val="tx1"/>
+                </a:solidFill>
+              </a:rPr>
+              <a:t>accurate TB testing</a:t>
             </a:r>
           </a:p>
         </p:txBody>
@@ -7296,22 +7299,22 @@
               <a:t>TB is </a:t>
             </a:r>
             <a:r>
-              <a:rPr lang="en-US" sz="4800" kern="0" dirty="0">
-                <a:solidFill>
-                  <a:srgbClr val="0000FF"/>
-                </a:solidFill>
-                <a:latin typeface="Comic Sans MS" pitchFamily="66" charset="0"/>
-              </a:rPr>
-              <a:t>98</a:t>
-            </a:r>
-            <a:r>
               <a:rPr lang="en-US" sz="4800" kern="0" dirty="0" smtClean="0">
                 <a:solidFill>
                   <a:srgbClr val="0000FF"/>
                 </a:solidFill>
                 <a:latin typeface="Comic Sans MS" pitchFamily="66" charset="0"/>
               </a:rPr>
-              <a:t>%.”</a:t>
+              <a:t>99%</a:t>
+            </a:r>
+            <a:r>
+              <a:rPr lang="en-US" sz="4800" kern="0" dirty="0" smtClean="0">
+                <a:solidFill>
+                  <a:srgbClr val="0000FF"/>
+                </a:solidFill>
+                <a:latin typeface="Comic Sans MS" pitchFamily="66" charset="0"/>
+              </a:rPr>
+              <a:t>.”</a:t>
             </a:r>
             <a:endParaRPr lang="en-US" sz="4800" kern="0" dirty="0">
               <a:solidFill>
@@ -7350,7 +7353,15 @@
                   <a:schemeClr val="tx1"/>
                 </a:solidFill>
               </a:rPr>
-              <a:t>98% accurate TB testing</a:t>
+              <a:t>99% </a:t>
+            </a:r>
+            <a:r>
+              <a:rPr lang="en-US" sz="4000" dirty="0" smtClean="0">
+                <a:solidFill>
+                  <a:schemeClr val="tx1"/>
+                </a:solidFill>
+              </a:rPr>
+              <a:t>accurate TB testing</a:t>
             </a:r>
           </a:p>
         </p:txBody>
@@ -8262,12 +8273,11 @@
             <a:r>
               <a:rPr lang="en-US" sz="4800" dirty="0">
                 <a:solidFill>
-                  <a:srgbClr val="FF00FF"/>
+                  <a:srgbClr val="FF0000"/>
                 </a:solidFill>
               </a:rPr>
               <a:t>?</a:t>
             </a:r>
-            <a:endParaRPr lang="en-US" sz="4800" dirty="0"/>
           </a:p>
         </p:txBody>
       </p:sp>
@@ -8293,14 +8303,28 @@
           <a:p>
             <a:r>
               <a:rPr lang="en-US" sz="5400" dirty="0" smtClean="0"/>
-              <a:t>But you personally are</a:t>
-            </a:r>
-          </a:p>
-          <a:p>
+              <a:t>But you </a:t>
+            </a:r>
             <a:r>
               <a:rPr lang="en-US" sz="5400" dirty="0" smtClean="0">
                 <a:solidFill>
-                  <a:srgbClr val="FF00FF"/>
+                  <a:schemeClr val="accent1">
+                    <a:lumMod val="50000"/>
+                  </a:schemeClr>
+                </a:solidFill>
+              </a:rPr>
+              <a:t>personally</a:t>
+            </a:r>
+            <a:r>
+              <a:rPr lang="en-US" sz="5400" dirty="0" smtClean="0"/>
+              <a:t> are</a:t>
+            </a:r>
+          </a:p>
+          <a:p>
+            <a:r>
+              <a:rPr lang="en-US" sz="5400" dirty="0" smtClean="0">
+                <a:solidFill>
+                  <a:srgbClr val="FF0000"/>
                 </a:solidFill>
               </a:rPr>
               <a:t>not</a:t>
@@ -8581,12 +8605,11 @@
             <a:r>
               <a:rPr lang="en-US" sz="4800" dirty="0">
                 <a:solidFill>
-                  <a:srgbClr val="FF00FF"/>
+                  <a:srgbClr val="FF0000"/>
                 </a:solidFill>
               </a:rPr>
               <a:t>?</a:t>
             </a:r>
-            <a:endParaRPr lang="en-US" sz="4800" dirty="0"/>
           </a:p>
         </p:txBody>
       </p:sp>
@@ -8612,34 +8635,48 @@
           <a:p>
             <a:r>
               <a:rPr lang="en-US" sz="5400" dirty="0" smtClean="0"/>
-              <a:t>But you personally are</a:t>
-            </a:r>
-          </a:p>
-          <a:p>
+              <a:t>But you </a:t>
+            </a:r>
             <a:r>
               <a:rPr lang="en-US" sz="5400" dirty="0" smtClean="0">
                 <a:solidFill>
-                  <a:srgbClr val="FF00FF"/>
+                  <a:schemeClr val="accent1">
+                    <a:lumMod val="50000"/>
+                  </a:schemeClr>
                 </a:solidFill>
               </a:rPr>
-              <a:t>not</a:t>
+              <a:t>personally</a:t>
             </a:r>
             <a:r>
               <a:rPr lang="en-US" sz="5400" dirty="0" smtClean="0"/>
-              <a:t> a random person.</a:t>
-            </a:r>
-          </a:p>
-          <a:p>
-            <a:r>
-              <a:rPr lang="en-US" sz="5400" dirty="0" smtClean="0"/>
-              <a:t>Either </a:t>
-            </a:r>
+              <a:t> are</a:t>
+            </a:r>
+          </a:p>
+          <a:p>
             <a:r>
               <a:rPr lang="en-US" sz="5400" dirty="0" smtClean="0">
                 <a:solidFill>
                   <a:srgbClr val="FF0000"/>
                 </a:solidFill>
               </a:rPr>
+              <a:t>not</a:t>
+            </a:r>
+            <a:r>
+              <a:rPr lang="en-US" sz="5400" dirty="0" smtClean="0"/>
+              <a:t> a random person.</a:t>
+            </a:r>
+          </a:p>
+          <a:p>
+            <a:r>
+              <a:rPr lang="en-US" sz="5400" dirty="0" smtClean="0"/>
+              <a:t>Either </a:t>
+            </a:r>
+            <a:r>
+              <a:rPr lang="en-US" sz="5400" dirty="0" smtClean="0">
+                <a:solidFill>
+                  <a:srgbClr val="FF0000"/>
+                </a:solidFill>
+              </a:rPr>
               <a:t>you have</a:t>
             </a:r>
             <a:r>
@@ -8657,15 +8694,20 @@
               <a:t>you don’t</a:t>
             </a:r>
             <a:r>
+              <a:rPr lang="en-US" sz="5400" dirty="0"/>
+              <a:t>.  Nothing </a:t>
+            </a:r>
+          </a:p>
+          <a:p>
+            <a:r>
+              <a:rPr lang="en-US" sz="5400" dirty="0"/>
+              <a:t>probabilistic about this</a:t>
+            </a:r>
+            <a:r>
               <a:rPr lang="en-US" sz="5400" dirty="0" smtClean="0"/>
-              <a:t>.  Nothing </a:t>
-            </a:r>
-          </a:p>
-          <a:p>
-            <a:r>
-              <a:rPr lang="en-US" sz="5400" dirty="0" smtClean="0"/>
-              <a:t>probabilistic about this.</a:t>
-            </a:r>
+              <a:t>.</a:t>
+            </a:r>
+            <a:endParaRPr lang="en-US" sz="5400" dirty="0"/>
           </a:p>
         </p:txBody>
       </p:sp>
@@ -8706,7 +8748,7 @@
     </p:spTree>
     <p:extLst>
       <p:ext uri="{BB962C8B-B14F-4D97-AF65-F5344CB8AC3E}">
-        <p14:creationId xmlns:p14="http://schemas.microsoft.com/office/powerpoint/2010/main" val="3874130490"/>
+        <p14:creationId xmlns:p14="http://schemas.microsoft.com/office/powerpoint/2010/main" val="1489213667"/>
       </p:ext>
     </p:extLst>
   </p:cSld>
@@ -8802,8 +8844,8 @@
         </p:nvSpPr>
         <p:spPr>
           <a:xfrm>
-            <a:off x="152400" y="1371600"/>
-            <a:ext cx="8686800" cy="4038600"/>
+            <a:off x="228600" y="1981200"/>
+            <a:ext cx="8686800" cy="3200400"/>
           </a:xfrm>
         </p:spPr>
         <p:txBody>
@@ -8816,8 +8858,22 @@
               </a:spcBef>
             </a:pPr>
             <a:r>
-              <a:rPr lang="en-US" sz="5400" dirty="0" smtClean="0"/>
-              <a:t>Whether you personally </a:t>
+              <a:rPr lang="en-US" sz="6000" dirty="0" smtClean="0"/>
+              <a:t>Whether you </a:t>
+            </a:r>
+            <a:r>
+              <a:rPr lang="en-US" sz="6000" dirty="0" smtClean="0">
+                <a:solidFill>
+                  <a:schemeClr val="accent1">
+                    <a:lumMod val="50000"/>
+                  </a:schemeClr>
+                </a:solidFill>
+              </a:rPr>
+              <a:t>personally</a:t>
+            </a:r>
+            <a:r>
+              <a:rPr lang="en-US" sz="6000" dirty="0" smtClean="0"/>
+              <a:t> </a:t>
             </a:r>
           </a:p>
           <a:p>
@@ -8827,19 +8883,19 @@
               </a:spcBef>
             </a:pPr>
             <a:r>
-              <a:rPr lang="en-US" sz="5400" dirty="0" smtClean="0"/>
+              <a:rPr lang="en-US" sz="6000" dirty="0" smtClean="0"/>
               <a:t>have TB is </a:t>
             </a:r>
             <a:r>
-              <a:rPr lang="en-US" sz="5400" dirty="0" smtClean="0">
+              <a:rPr lang="en-US" sz="6000" dirty="0" smtClean="0">
                 <a:solidFill>
-                  <a:srgbClr val="FF6600"/>
+                  <a:srgbClr val="FF00FF"/>
                 </a:solidFill>
               </a:rPr>
               <a:t>unknown</a:t>
             </a:r>
             <a:r>
-              <a:rPr lang="en-US" sz="5400" dirty="0" smtClean="0"/>
+              <a:rPr lang="en-US" sz="6000" dirty="0" smtClean="0"/>
               <a:t>,</a:t>
             </a:r>
           </a:p>
@@ -8850,19 +8906,19 @@
               </a:spcBef>
             </a:pPr>
             <a:r>
-              <a:rPr lang="en-US" sz="5400" dirty="0" smtClean="0"/>
+              <a:rPr lang="en-US" sz="6000" dirty="0" smtClean="0"/>
               <a:t>but </a:t>
             </a:r>
             <a:r>
-              <a:rPr lang="en-US" sz="5400" dirty="0" smtClean="0">
+              <a:rPr lang="en-US" sz="6000" dirty="0" smtClean="0">
                 <a:solidFill>
-                  <a:srgbClr val="FF00FF"/>
+                  <a:srgbClr val="FF0000"/>
                 </a:solidFill>
               </a:rPr>
               <a:t>not</a:t>
             </a:r>
             <a:r>
-              <a:rPr lang="en-US" sz="5400" dirty="0" smtClean="0"/>
+              <a:rPr lang="en-US" sz="6000" dirty="0" smtClean="0"/>
               <a:t> a random event!</a:t>
             </a:r>
           </a:p>
@@ -8895,7 +8951,7 @@
             <a:r>
               <a:rPr lang="en-US" sz="4800" dirty="0" smtClean="0">
                 <a:solidFill>
-                  <a:srgbClr val="FF00FF"/>
+                  <a:srgbClr val="FF0000"/>
                 </a:solidFill>
               </a:rPr>
               <a:t>not</a:t>

</xml_diff>